<commit_message>
Fix small bugs in slide
</commit_message>
<xml_diff>
--- a/Presentation.pptx
+++ b/Presentation.pptx
@@ -11984,11 +11984,13 @@
         </p:nvSpPr>
         <p:spPr/>
         <p:txBody>
-          <a:bodyPr/>
+          <a:bodyPr>
+            <a:normAutofit/>
+          </a:bodyPr>
           <a:lstStyle/>
           <a:p>
             <a:r>
-              <a:rPr lang="en-US" dirty="0"/>
+              <a:rPr lang="en-US" sz="4400" dirty="0"/>
               <a:t>Deep Dive 4</a:t>
             </a:r>
           </a:p>
@@ -12433,7 +12435,7 @@
           <a:p>
             <a:r>
               <a:rPr lang="en-US" altLang="zh-CN" dirty="0"/>
-              <a:t>The original data has 60 columns.</a:t>
+              <a:t>The original dataset has 60 columns.</a:t>
             </a:r>
           </a:p>
           <a:p>
@@ -12460,7 +12462,7 @@
           <a:p>
             <a:r>
               <a:rPr lang="en-US" altLang="zh-CN" dirty="0"/>
-              <a:t>The finial data for training has 13 features besides the target value, “</a:t>
+              <a:t>The finial data for training has 14 features besides the target value, “</a:t>
             </a:r>
             <a:r>
               <a:rPr lang="en-US" altLang="zh-CN" dirty="0" err="1"/>
@@ -12497,7 +12499,15 @@
           <a:bodyPr/>
           <a:lstStyle/>
           <a:p>
-            <a:endParaRPr lang="zh-CN" altLang="en-US"/>
+            <a:r>
+              <a:rPr lang="en-US" altLang="zh-CN" dirty="0"/>
+              <a:t>Industrial Engineering/ME434 Deep Learning </a:t>
+            </a:r>
+            <a:r>
+              <a:rPr lang="en-US" altLang="zh-CN" dirty="0" err="1"/>
+              <a:t>Maths</a:t>
+            </a:r>
+            <a:endParaRPr lang="en-US" altLang="zh-CN" dirty="0"/>
           </a:p>
         </p:txBody>
       </p:sp>

</xml_diff>